<commit_message>
Primer prototipo de estetica
</commit_message>
<xml_diff>
--- a/utilidades/Proyecto-UNO-Algos-Disenio.pptx
+++ b/utilidades/Proyecto-UNO-Algos-Disenio.pptx
@@ -5,14 +5,14 @@
     <p:sldMasterId id="2147483648" r:id="rId1"/>
   </p:sldMasterIdLst>
   <p:sldIdLst>
-    <p:sldId id="256" r:id="rId2"/>
-    <p:sldId id="259" r:id="rId3"/>
-    <p:sldId id="260" r:id="rId4"/>
-    <p:sldId id="257" r:id="rId5"/>
-    <p:sldId id="261" r:id="rId6"/>
-    <p:sldId id="262" r:id="rId7"/>
-    <p:sldId id="263" r:id="rId8"/>
-    <p:sldId id="264" r:id="rId9"/>
+    <p:sldId id="256" r:id="rId3"/>
+    <p:sldId id="259" r:id="rId4"/>
+    <p:sldId id="260" r:id="rId5"/>
+    <p:sldId id="257" r:id="rId6"/>
+    <p:sldId id="261" r:id="rId7"/>
+    <p:sldId id="262" r:id="rId8"/>
+    <p:sldId id="263" r:id="rId9"/>
+    <p:sldId id="264" r:id="rId10"/>
   </p:sldIdLst>
   <p:sldSz cx="12192000" cy="6858000"/>
   <p:notesSz cx="6858000" cy="9144000"/>
@@ -111,11 +111,6 @@
       </a:defRPr>
     </a:lvl9pPr>
   </p:defaultTextStyle>
-  <p:extLst>
-    <p:ext uri="{EFAFB233-063F-42B5-8137-9DF3F51BA10A}">
-      <p15:sldGuideLst xmlns:p15="http://schemas.microsoft.com/office/powerpoint/2012/main"/>
-    </p:ext>
-  </p:extLst>
 </p:presentation>
 </file>
 
@@ -250,7 +245,6 @@
           <a:p>
             <a:fld id="{FEAFEC77-9C1C-47A2-8AE2-65CEBDA57C77}" type="datetimeFigureOut">
               <a:rPr lang="es-MX" smtClean="0"/>
-              <a:t>29/04/2024</a:t>
             </a:fld>
             <a:endParaRPr lang="es-MX"/>
           </a:p>
@@ -292,7 +286,6 @@
           <a:p>
             <a:fld id="{9878A3BC-152E-409D-B039-64467F2BDC2F}" type="slidenum">
               <a:rPr lang="es-MX" smtClean="0"/>
-              <a:t>‹#›</a:t>
             </a:fld>
             <a:endParaRPr lang="es-MX"/>
           </a:p>
@@ -366,6 +359,7 @@
               <a:rPr lang="en-US"/>
               <a:t>Click to edit Master text styles</a:t>
             </a:r>
+            <a:endParaRPr lang="en-US"/>
           </a:p>
           <a:p>
             <a:pPr lvl="1"/>
@@ -373,6 +367,7 @@
               <a:rPr lang="en-US"/>
               <a:t>Second level</a:t>
             </a:r>
+            <a:endParaRPr lang="en-US"/>
           </a:p>
           <a:p>
             <a:pPr lvl="2"/>
@@ -380,6 +375,7 @@
               <a:rPr lang="en-US"/>
               <a:t>Third level</a:t>
             </a:r>
+            <a:endParaRPr lang="en-US"/>
           </a:p>
           <a:p>
             <a:pPr lvl="3"/>
@@ -387,6 +383,7 @@
               <a:rPr lang="en-US"/>
               <a:t>Fourth level</a:t>
             </a:r>
+            <a:endParaRPr lang="en-US"/>
           </a:p>
           <a:p>
             <a:pPr lvl="4"/>
@@ -415,7 +412,6 @@
           <a:p>
             <a:fld id="{FEAFEC77-9C1C-47A2-8AE2-65CEBDA57C77}" type="datetimeFigureOut">
               <a:rPr lang="es-MX" smtClean="0"/>
-              <a:t>29/04/2024</a:t>
             </a:fld>
             <a:endParaRPr lang="es-MX"/>
           </a:p>
@@ -457,7 +453,6 @@
           <a:p>
             <a:fld id="{9878A3BC-152E-409D-B039-64467F2BDC2F}" type="slidenum">
               <a:rPr lang="es-MX" smtClean="0"/>
-              <a:t>‹#›</a:t>
             </a:fld>
             <a:endParaRPr lang="es-MX"/>
           </a:p>
@@ -541,6 +536,7 @@
               <a:rPr lang="en-US"/>
               <a:t>Click to edit Master text styles</a:t>
             </a:r>
+            <a:endParaRPr lang="en-US"/>
           </a:p>
           <a:p>
             <a:pPr lvl="1"/>
@@ -548,6 +544,7 @@
               <a:rPr lang="en-US"/>
               <a:t>Second level</a:t>
             </a:r>
+            <a:endParaRPr lang="en-US"/>
           </a:p>
           <a:p>
             <a:pPr lvl="2"/>
@@ -555,6 +552,7 @@
               <a:rPr lang="en-US"/>
               <a:t>Third level</a:t>
             </a:r>
+            <a:endParaRPr lang="en-US"/>
           </a:p>
           <a:p>
             <a:pPr lvl="3"/>
@@ -562,6 +560,7 @@
               <a:rPr lang="en-US"/>
               <a:t>Fourth level</a:t>
             </a:r>
+            <a:endParaRPr lang="en-US"/>
           </a:p>
           <a:p>
             <a:pPr lvl="4"/>
@@ -590,7 +589,6 @@
           <a:p>
             <a:fld id="{FEAFEC77-9C1C-47A2-8AE2-65CEBDA57C77}" type="datetimeFigureOut">
               <a:rPr lang="es-MX" smtClean="0"/>
-              <a:t>29/04/2024</a:t>
             </a:fld>
             <a:endParaRPr lang="es-MX"/>
           </a:p>
@@ -632,7 +630,6 @@
           <a:p>
             <a:fld id="{9878A3BC-152E-409D-B039-64467F2BDC2F}" type="slidenum">
               <a:rPr lang="es-MX" smtClean="0"/>
-              <a:t>‹#›</a:t>
             </a:fld>
             <a:endParaRPr lang="es-MX"/>
           </a:p>
@@ -706,6 +703,7 @@
               <a:rPr lang="en-US"/>
               <a:t>Click to edit Master text styles</a:t>
             </a:r>
+            <a:endParaRPr lang="en-US"/>
           </a:p>
           <a:p>
             <a:pPr lvl="1"/>
@@ -713,6 +711,7 @@
               <a:rPr lang="en-US"/>
               <a:t>Second level</a:t>
             </a:r>
+            <a:endParaRPr lang="en-US"/>
           </a:p>
           <a:p>
             <a:pPr lvl="2"/>
@@ -720,6 +719,7 @@
               <a:rPr lang="en-US"/>
               <a:t>Third level</a:t>
             </a:r>
+            <a:endParaRPr lang="en-US"/>
           </a:p>
           <a:p>
             <a:pPr lvl="3"/>
@@ -727,6 +727,7 @@
               <a:rPr lang="en-US"/>
               <a:t>Fourth level</a:t>
             </a:r>
+            <a:endParaRPr lang="en-US"/>
           </a:p>
           <a:p>
             <a:pPr lvl="4"/>
@@ -755,7 +756,6 @@
           <a:p>
             <a:fld id="{FEAFEC77-9C1C-47A2-8AE2-65CEBDA57C77}" type="datetimeFigureOut">
               <a:rPr lang="es-MX" smtClean="0"/>
-              <a:t>29/04/2024</a:t>
             </a:fld>
             <a:endParaRPr lang="es-MX"/>
           </a:p>
@@ -797,7 +797,6 @@
           <a:p>
             <a:fld id="{9878A3BC-152E-409D-B039-64467F2BDC2F}" type="slidenum">
               <a:rPr lang="es-MX" smtClean="0"/>
-              <a:t>‹#›</a:t>
             </a:fld>
             <a:endParaRPr lang="es-MX"/>
           </a:p>
@@ -976,6 +975,7 @@
               <a:rPr lang="en-US"/>
               <a:t>Click to edit Master text styles</a:t>
             </a:r>
+            <a:endParaRPr lang="en-US"/>
           </a:p>
         </p:txBody>
       </p:sp>
@@ -996,7 +996,6 @@
           <a:p>
             <a:fld id="{FEAFEC77-9C1C-47A2-8AE2-65CEBDA57C77}" type="datetimeFigureOut">
               <a:rPr lang="es-MX" smtClean="0"/>
-              <a:t>29/04/2024</a:t>
             </a:fld>
             <a:endParaRPr lang="es-MX"/>
           </a:p>
@@ -1038,7 +1037,6 @@
           <a:p>
             <a:fld id="{9878A3BC-152E-409D-B039-64467F2BDC2F}" type="slidenum">
               <a:rPr lang="es-MX" smtClean="0"/>
-              <a:t>‹#›</a:t>
             </a:fld>
             <a:endParaRPr lang="es-MX"/>
           </a:p>
@@ -1117,6 +1115,7 @@
               <a:rPr lang="en-US"/>
               <a:t>Click to edit Master text styles</a:t>
             </a:r>
+            <a:endParaRPr lang="en-US"/>
           </a:p>
           <a:p>
             <a:pPr lvl="1"/>
@@ -1124,6 +1123,7 @@
               <a:rPr lang="en-US"/>
               <a:t>Second level</a:t>
             </a:r>
+            <a:endParaRPr lang="en-US"/>
           </a:p>
           <a:p>
             <a:pPr lvl="2"/>
@@ -1131,6 +1131,7 @@
               <a:rPr lang="en-US"/>
               <a:t>Third level</a:t>
             </a:r>
+            <a:endParaRPr lang="en-US"/>
           </a:p>
           <a:p>
             <a:pPr lvl="3"/>
@@ -1138,6 +1139,7 @@
               <a:rPr lang="en-US"/>
               <a:t>Fourth level</a:t>
             </a:r>
+            <a:endParaRPr lang="en-US"/>
           </a:p>
           <a:p>
             <a:pPr lvl="4"/>
@@ -1174,6 +1176,7 @@
               <a:rPr lang="en-US"/>
               <a:t>Click to edit Master text styles</a:t>
             </a:r>
+            <a:endParaRPr lang="en-US"/>
           </a:p>
           <a:p>
             <a:pPr lvl="1"/>
@@ -1181,6 +1184,7 @@
               <a:rPr lang="en-US"/>
               <a:t>Second level</a:t>
             </a:r>
+            <a:endParaRPr lang="en-US"/>
           </a:p>
           <a:p>
             <a:pPr lvl="2"/>
@@ -1188,6 +1192,7 @@
               <a:rPr lang="en-US"/>
               <a:t>Third level</a:t>
             </a:r>
+            <a:endParaRPr lang="en-US"/>
           </a:p>
           <a:p>
             <a:pPr lvl="3"/>
@@ -1195,6 +1200,7 @@
               <a:rPr lang="en-US"/>
               <a:t>Fourth level</a:t>
             </a:r>
+            <a:endParaRPr lang="en-US"/>
           </a:p>
           <a:p>
             <a:pPr lvl="4"/>
@@ -1223,7 +1229,6 @@
           <a:p>
             <a:fld id="{FEAFEC77-9C1C-47A2-8AE2-65CEBDA57C77}" type="datetimeFigureOut">
               <a:rPr lang="es-MX" smtClean="0"/>
-              <a:t>29/04/2024</a:t>
             </a:fld>
             <a:endParaRPr lang="es-MX"/>
           </a:p>
@@ -1265,7 +1270,6 @@
           <a:p>
             <a:fld id="{9878A3BC-152E-409D-B039-64467F2BDC2F}" type="slidenum">
               <a:rPr lang="es-MX" smtClean="0"/>
-              <a:t>‹#›</a:t>
             </a:fld>
             <a:endParaRPr lang="es-MX"/>
           </a:p>
@@ -1386,6 +1390,7 @@
               <a:rPr lang="en-US"/>
               <a:t>Click to edit Master text styles</a:t>
             </a:r>
+            <a:endParaRPr lang="en-US"/>
           </a:p>
         </p:txBody>
       </p:sp>
@@ -1414,6 +1419,7 @@
               <a:rPr lang="en-US"/>
               <a:t>Click to edit Master text styles</a:t>
             </a:r>
+            <a:endParaRPr lang="en-US"/>
           </a:p>
           <a:p>
             <a:pPr lvl="1"/>
@@ -1421,6 +1427,7 @@
               <a:rPr lang="en-US"/>
               <a:t>Second level</a:t>
             </a:r>
+            <a:endParaRPr lang="en-US"/>
           </a:p>
           <a:p>
             <a:pPr lvl="2"/>
@@ -1428,6 +1435,7 @@
               <a:rPr lang="en-US"/>
               <a:t>Third level</a:t>
             </a:r>
+            <a:endParaRPr lang="en-US"/>
           </a:p>
           <a:p>
             <a:pPr lvl="3"/>
@@ -1435,6 +1443,7 @@
               <a:rPr lang="en-US"/>
               <a:t>Fourth level</a:t>
             </a:r>
+            <a:endParaRPr lang="en-US"/>
           </a:p>
           <a:p>
             <a:pPr lvl="4"/>
@@ -1508,6 +1517,7 @@
               <a:rPr lang="en-US"/>
               <a:t>Click to edit Master text styles</a:t>
             </a:r>
+            <a:endParaRPr lang="en-US"/>
           </a:p>
         </p:txBody>
       </p:sp>
@@ -1536,6 +1546,7 @@
               <a:rPr lang="en-US"/>
               <a:t>Click to edit Master text styles</a:t>
             </a:r>
+            <a:endParaRPr lang="en-US"/>
           </a:p>
           <a:p>
             <a:pPr lvl="1"/>
@@ -1543,6 +1554,7 @@
               <a:rPr lang="en-US"/>
               <a:t>Second level</a:t>
             </a:r>
+            <a:endParaRPr lang="en-US"/>
           </a:p>
           <a:p>
             <a:pPr lvl="2"/>
@@ -1550,6 +1562,7 @@
               <a:rPr lang="en-US"/>
               <a:t>Third level</a:t>
             </a:r>
+            <a:endParaRPr lang="en-US"/>
           </a:p>
           <a:p>
             <a:pPr lvl="3"/>
@@ -1557,6 +1570,7 @@
               <a:rPr lang="en-US"/>
               <a:t>Fourth level</a:t>
             </a:r>
+            <a:endParaRPr lang="en-US"/>
           </a:p>
           <a:p>
             <a:pPr lvl="4"/>
@@ -1585,7 +1599,6 @@
           <a:p>
             <a:fld id="{FEAFEC77-9C1C-47A2-8AE2-65CEBDA57C77}" type="datetimeFigureOut">
               <a:rPr lang="es-MX" smtClean="0"/>
-              <a:t>29/04/2024</a:t>
             </a:fld>
             <a:endParaRPr lang="es-MX"/>
           </a:p>
@@ -1627,7 +1640,6 @@
           <a:p>
             <a:fld id="{9878A3BC-152E-409D-B039-64467F2BDC2F}" type="slidenum">
               <a:rPr lang="es-MX" smtClean="0"/>
-              <a:t>‹#›</a:t>
             </a:fld>
             <a:endParaRPr lang="es-MX"/>
           </a:p>
@@ -1698,7 +1710,6 @@
           <a:p>
             <a:fld id="{FEAFEC77-9C1C-47A2-8AE2-65CEBDA57C77}" type="datetimeFigureOut">
               <a:rPr lang="es-MX" smtClean="0"/>
-              <a:t>29/04/2024</a:t>
             </a:fld>
             <a:endParaRPr lang="es-MX"/>
           </a:p>
@@ -1740,7 +1751,6 @@
           <a:p>
             <a:fld id="{9878A3BC-152E-409D-B039-64467F2BDC2F}" type="slidenum">
               <a:rPr lang="es-MX" smtClean="0"/>
-              <a:t>‹#›</a:t>
             </a:fld>
             <a:endParaRPr lang="es-MX"/>
           </a:p>
@@ -1788,7 +1798,6 @@
           <a:p>
             <a:fld id="{FEAFEC77-9C1C-47A2-8AE2-65CEBDA57C77}" type="datetimeFigureOut">
               <a:rPr lang="es-MX" smtClean="0"/>
-              <a:t>29/04/2024</a:t>
             </a:fld>
             <a:endParaRPr lang="es-MX"/>
           </a:p>
@@ -1830,7 +1839,6 @@
           <a:p>
             <a:fld id="{9878A3BC-152E-409D-B039-64467F2BDC2F}" type="slidenum">
               <a:rPr lang="es-MX" smtClean="0"/>
-              <a:t>‹#›</a:t>
             </a:fld>
             <a:endParaRPr lang="es-MX"/>
           </a:p>
@@ -1946,6 +1954,7 @@
               <a:rPr lang="en-US"/>
               <a:t>Click to edit Master text styles</a:t>
             </a:r>
+            <a:endParaRPr lang="en-US"/>
           </a:p>
           <a:p>
             <a:pPr lvl="1"/>
@@ -1953,6 +1962,7 @@
               <a:rPr lang="en-US"/>
               <a:t>Second level</a:t>
             </a:r>
+            <a:endParaRPr lang="en-US"/>
           </a:p>
           <a:p>
             <a:pPr lvl="2"/>
@@ -1960,6 +1970,7 @@
               <a:rPr lang="en-US"/>
               <a:t>Third level</a:t>
             </a:r>
+            <a:endParaRPr lang="en-US"/>
           </a:p>
           <a:p>
             <a:pPr lvl="3"/>
@@ -1967,6 +1978,7 @@
               <a:rPr lang="en-US"/>
               <a:t>Fourth level</a:t>
             </a:r>
+            <a:endParaRPr lang="en-US"/>
           </a:p>
           <a:p>
             <a:pPr lvl="4"/>
@@ -2040,6 +2052,7 @@
               <a:rPr lang="en-US"/>
               <a:t>Click to edit Master text styles</a:t>
             </a:r>
+            <a:endParaRPr lang="en-US"/>
           </a:p>
         </p:txBody>
       </p:sp>
@@ -2060,7 +2073,6 @@
           <a:p>
             <a:fld id="{FEAFEC77-9C1C-47A2-8AE2-65CEBDA57C77}" type="datetimeFigureOut">
               <a:rPr lang="es-MX" smtClean="0"/>
-              <a:t>29/04/2024</a:t>
             </a:fld>
             <a:endParaRPr lang="es-MX"/>
           </a:p>
@@ -2102,7 +2114,6 @@
           <a:p>
             <a:fld id="{9878A3BC-152E-409D-B039-64467F2BDC2F}" type="slidenum">
               <a:rPr lang="es-MX" smtClean="0"/>
-              <a:t>‹#›</a:t>
             </a:fld>
             <a:endParaRPr lang="es-MX"/>
           </a:p>
@@ -2288,6 +2299,7 @@
               <a:rPr lang="en-US"/>
               <a:t>Click to edit Master text styles</a:t>
             </a:r>
+            <a:endParaRPr lang="en-US"/>
           </a:p>
         </p:txBody>
       </p:sp>
@@ -2308,7 +2320,6 @@
           <a:p>
             <a:fld id="{FEAFEC77-9C1C-47A2-8AE2-65CEBDA57C77}" type="datetimeFigureOut">
               <a:rPr lang="es-MX" smtClean="0"/>
-              <a:t>29/04/2024</a:t>
             </a:fld>
             <a:endParaRPr lang="es-MX"/>
           </a:p>
@@ -2350,7 +2361,6 @@
           <a:p>
             <a:fld id="{9878A3BC-152E-409D-B039-64467F2BDC2F}" type="slidenum">
               <a:rPr lang="es-MX" smtClean="0"/>
-              <a:t>‹#›</a:t>
             </a:fld>
             <a:endParaRPr lang="es-MX"/>
           </a:p>
@@ -2449,6 +2459,7 @@
               <a:rPr lang="en-US"/>
               <a:t>Click to edit Master text styles</a:t>
             </a:r>
+            <a:endParaRPr lang="en-US"/>
           </a:p>
           <a:p>
             <a:pPr lvl="1"/>
@@ -2456,6 +2467,7 @@
               <a:rPr lang="en-US"/>
               <a:t>Second level</a:t>
             </a:r>
+            <a:endParaRPr lang="en-US"/>
           </a:p>
           <a:p>
             <a:pPr lvl="2"/>
@@ -2463,6 +2475,7 @@
               <a:rPr lang="en-US"/>
               <a:t>Third level</a:t>
             </a:r>
+            <a:endParaRPr lang="en-US"/>
           </a:p>
           <a:p>
             <a:pPr lvl="3"/>
@@ -2470,6 +2483,7 @@
               <a:rPr lang="en-US"/>
               <a:t>Fourth level</a:t>
             </a:r>
+            <a:endParaRPr lang="en-US"/>
           </a:p>
           <a:p>
             <a:pPr lvl="4"/>
@@ -2516,7 +2530,6 @@
           <a:p>
             <a:fld id="{FEAFEC77-9C1C-47A2-8AE2-65CEBDA57C77}" type="datetimeFigureOut">
               <a:rPr lang="es-MX" smtClean="0"/>
-              <a:t>29/04/2024</a:t>
             </a:fld>
             <a:endParaRPr lang="es-MX"/>
           </a:p>
@@ -2594,7 +2607,6 @@
           <a:p>
             <a:fld id="{9878A3BC-152E-409D-B039-64467F2BDC2F}" type="slidenum">
               <a:rPr lang="es-MX" smtClean="0"/>
-              <a:t>‹#›</a:t>
             </a:fld>
             <a:endParaRPr lang="es-MX"/>
           </a:p>
@@ -8183,6 +8195,27 @@
               </a:rPr>
               <a:t>+2</a:t>
             </a:r>
+            <a:endParaRPr lang="en-US" sz="9600" spc="-300" dirty="0">
+              <a:ln>
+                <a:solidFill>
+                  <a:schemeClr val="tx1">
+                    <a:lumMod val="95000"/>
+                    <a:lumOff val="5000"/>
+                  </a:schemeClr>
+                </a:solidFill>
+              </a:ln>
+              <a:solidFill>
+                <a:schemeClr val="bg1"/>
+              </a:solidFill>
+              <a:effectLst>
+                <a:outerShdw dist="38100" dir="2700000" algn="tl" rotWithShape="0">
+                  <a:prstClr val="black">
+                    <a:alpha val="90000"/>
+                  </a:prstClr>
+                </a:outerShdw>
+              </a:effectLst>
+              <a:latin typeface="Arial Black" panose="020B0A04020102020204" pitchFamily="34" charset="0"/>
+            </a:endParaRPr>
           </a:p>
         </p:txBody>
       </p:sp>
@@ -8195,13 +8228,13 @@
           <p:nvPr/>
         </p:nvPicPr>
         <p:blipFill>
-          <a:blip r:embed="rId2">
+          <a:blip r:embed="rId1">
             <a:extLst>
               <a:ext uri="{28A0092B-C50C-407E-A947-70E740481C1C}">
                 <a14:useLocalDpi xmlns:a14="http://schemas.microsoft.com/office/drawing/2010/main" val="0"/>
               </a:ext>
               <a:ext uri="{96DAC541-7B7A-43D3-8B79-37D633B846F1}">
-                <asvg:svgBlip xmlns:asvg="http://schemas.microsoft.com/office/drawing/2016/SVG/main" r:embed="rId3"/>
+                <asvg:svgBlip xmlns:asvg="http://schemas.microsoft.com/office/drawing/2016/SVG/main" r:embed="rId2"/>
               </a:ext>
             </a:extLst>
           </a:blip>
@@ -8928,13 +8961,13 @@
           <p:nvPr/>
         </p:nvPicPr>
         <p:blipFill>
-          <a:blip r:embed="rId4">
+          <a:blip r:embed="rId3">
             <a:extLst>
               <a:ext uri="{28A0092B-C50C-407E-A947-70E740481C1C}">
                 <a14:useLocalDpi xmlns:a14="http://schemas.microsoft.com/office/drawing/2010/main" val="0"/>
               </a:ext>
               <a:ext uri="{96DAC541-7B7A-43D3-8B79-37D633B846F1}">
-                <asvg:svgBlip xmlns:asvg="http://schemas.microsoft.com/office/drawing/2016/SVG/main" r:embed="rId5"/>
+                <asvg:svgBlip xmlns:asvg="http://schemas.microsoft.com/office/drawing/2016/SVG/main" r:embed="rId4"/>
               </a:ext>
             </a:extLst>
           </a:blip>
@@ -9657,13 +9690,13 @@
           <p:nvPr/>
         </p:nvPicPr>
         <p:blipFill>
-          <a:blip r:embed="rId6">
+          <a:blip r:embed="rId5">
             <a:extLst>
               <a:ext uri="{28A0092B-C50C-407E-A947-70E740481C1C}">
                 <a14:useLocalDpi xmlns:a14="http://schemas.microsoft.com/office/drawing/2010/main" val="0"/>
               </a:ext>
               <a:ext uri="{96DAC541-7B7A-43D3-8B79-37D633B846F1}">
-                <asvg:svgBlip xmlns:asvg="http://schemas.microsoft.com/office/drawing/2016/SVG/main" r:embed="rId7"/>
+                <asvg:svgBlip xmlns:asvg="http://schemas.microsoft.com/office/drawing/2016/SVG/main" r:embed="rId6"/>
               </a:ext>
             </a:extLst>
           </a:blip>
@@ -10386,13 +10419,13 @@
           <p:nvPr/>
         </p:nvPicPr>
         <p:blipFill>
-          <a:blip r:embed="rId8">
+          <a:blip r:embed="rId7">
             <a:extLst>
               <a:ext uri="{28A0092B-C50C-407E-A947-70E740481C1C}">
                 <a14:useLocalDpi xmlns:a14="http://schemas.microsoft.com/office/drawing/2010/main" val="0"/>
               </a:ext>
               <a:ext uri="{96DAC541-7B7A-43D3-8B79-37D633B846F1}">
-                <asvg:svgBlip xmlns:asvg="http://schemas.microsoft.com/office/drawing/2016/SVG/main" r:embed="rId9"/>
+                <asvg:svgBlip xmlns:asvg="http://schemas.microsoft.com/office/drawing/2016/SVG/main" r:embed="rId8"/>
               </a:ext>
             </a:extLst>
           </a:blip>
@@ -11115,13 +11148,13 @@
           <p:nvPr/>
         </p:nvPicPr>
         <p:blipFill>
-          <a:blip r:embed="rId10">
+          <a:blip r:embed="rId9">
             <a:extLst>
               <a:ext uri="{28A0092B-C50C-407E-A947-70E740481C1C}">
                 <a14:useLocalDpi xmlns:a14="http://schemas.microsoft.com/office/drawing/2010/main" val="0"/>
               </a:ext>
               <a:ext uri="{96DAC541-7B7A-43D3-8B79-37D633B846F1}">
-                <asvg:svgBlip xmlns:asvg="http://schemas.microsoft.com/office/drawing/2016/SVG/main" r:embed="rId11"/>
+                <asvg:svgBlip xmlns:asvg="http://schemas.microsoft.com/office/drawing/2016/SVG/main" r:embed="rId10"/>
               </a:ext>
             </a:extLst>
           </a:blip>
@@ -12182,13 +12215,7 @@
       </p:grpSpPr>
       <p:sp>
         <p:nvSpPr>
-          <p:cNvPr id="4" name="TextBox 3">
-            <a:extLst>
-              <a:ext uri="{FF2B5EF4-FFF2-40B4-BE49-F238E27FC236}">
-                <a16:creationId xmlns:a16="http://schemas.microsoft.com/office/drawing/2014/main" id="{F532AB5A-5A24-2100-E831-85F0CC46F56D}"/>
-              </a:ext>
-            </a:extLst>
-          </p:cNvPr>
+          <p:cNvPr id="4" name="TextBox 3"/>
           <p:cNvSpPr txBox="1"/>
           <p:nvPr/>
         </p:nvSpPr>
@@ -12257,11 +12284,6 @@
         </p:txBody>
       </p:sp>
     </p:spTree>
-    <p:extLst>
-      <p:ext uri="{BB962C8B-B14F-4D97-AF65-F5344CB8AC3E}">
-        <p14:creationId xmlns:p14="http://schemas.microsoft.com/office/powerpoint/2010/main" val="980555321"/>
-      </p:ext>
-    </p:extLst>
   </p:cSld>
   <p:clrMapOvr>
     <a:masterClrMapping/>
@@ -12288,13 +12310,7 @@
       </p:grpSpPr>
       <p:sp>
         <p:nvSpPr>
-          <p:cNvPr id="4" name="TextBox 3">
-            <a:extLst>
-              <a:ext uri="{FF2B5EF4-FFF2-40B4-BE49-F238E27FC236}">
-                <a16:creationId xmlns:a16="http://schemas.microsoft.com/office/drawing/2014/main" id="{EB3CB61E-1C47-A205-7C49-1BBFABB4B1EF}"/>
-              </a:ext>
-            </a:extLst>
-          </p:cNvPr>
+          <p:cNvPr id="4" name="TextBox 3"/>
           <p:cNvSpPr txBox="1"/>
           <p:nvPr/>
         </p:nvSpPr>
@@ -12363,11 +12379,6 @@
         </p:txBody>
       </p:sp>
     </p:spTree>
-    <p:extLst>
-      <p:ext uri="{BB962C8B-B14F-4D97-AF65-F5344CB8AC3E}">
-        <p14:creationId xmlns:p14="http://schemas.microsoft.com/office/powerpoint/2010/main" val="1166806736"/>
-      </p:ext>
-    </p:extLst>
   </p:cSld>
   <p:clrMapOvr>
     <a:masterClrMapping/>
@@ -12626,8 +12637,6 @@
       </a:bgFillStyleLst>
     </a:fmtScheme>
   </a:themeElements>
-  <a:objectDefaults/>
-  <a:extraClrSchemeLst/>
   <a:extLst>
     <a:ext uri="{05A4C25C-085E-4340-85A3-A5531E510DB2}">
       <thm15:themeFamily xmlns:thm15="http://schemas.microsoft.com/office/thememl/2012/main" name="Office Theme" id="{62F939B6-93AF-4DB8-9C6B-D6C7DFDC589F}" vid="{4A3C46E8-61CC-4603-A589-7422A47A8E4A}"/>

</xml_diff>